<commit_message>
ScrumBoard, BurndownChart, GanttChart and Readme updated
</commit_message>
<xml_diff>
--- a/SE202526/Management/Sprint3/Scrum_Board_Sprint 3.pptx
+++ b/SE202526/Management/Sprint3/Scrum_Board_Sprint 3.pptx
@@ -5,7 +5,7 @@
     <p:sldMasterId id="2147483659" r:id="rId1"/>
   </p:sldMasterIdLst>
   <p:notesMasterIdLst>
-    <p:notesMasterId r:id="rId11"/>
+    <p:notesMasterId r:id="rId12"/>
   </p:notesMasterIdLst>
   <p:sldIdLst>
     <p:sldId id="256" r:id="rId2"/>
@@ -16,7 +16,8 @@
     <p:sldId id="268" r:id="rId7"/>
     <p:sldId id="269" r:id="rId8"/>
     <p:sldId id="270" r:id="rId9"/>
-    <p:sldId id="263" r:id="rId10"/>
+    <p:sldId id="271" r:id="rId10"/>
+    <p:sldId id="263" r:id="rId11"/>
   </p:sldIdLst>
   <p:sldSz cx="21599525" cy="10799763"/>
   <p:notesSz cx="6858000" cy="9144000"/>
@@ -813,6 +814,110 @@
 </p:notes>
 </file>
 
+<file path=ppt/notesSlides/notesSlide10.xml><?xml version="1.0" encoding="utf-8"?>
+<p:notes xmlns:a="http://schemas.openxmlformats.org/drawingml/2006/main" xmlns:r="http://schemas.openxmlformats.org/officeDocument/2006/relationships" xmlns:p="http://schemas.openxmlformats.org/presentationml/2006/main" showMasterSp="0" showMasterPhAnim="0">
+  <p:cSld>
+    <p:spTree>
+      <p:nvGrpSpPr>
+        <p:cNvPr id="1" name="Shape 217"/>
+        <p:cNvGrpSpPr/>
+        <p:nvPr/>
+      </p:nvGrpSpPr>
+      <p:grpSpPr>
+        <a:xfrm>
+          <a:off x="0" y="0"/>
+          <a:ext cx="0" cy="0"/>
+          <a:chOff x="0" y="0"/>
+          <a:chExt cx="0" cy="0"/>
+        </a:xfrm>
+      </p:grpSpPr>
+      <p:sp>
+        <p:nvSpPr>
+          <p:cNvPr id="218" name="Google Shape;218;g3850b307b58_0_258:notes"/>
+          <p:cNvSpPr>
+            <a:spLocks noGrp="1" noRot="1" noChangeAspect="1"/>
+          </p:cNvSpPr>
+          <p:nvPr>
+            <p:ph type="sldImg" idx="2"/>
+          </p:nvPr>
+        </p:nvSpPr>
+        <p:spPr>
+          <a:xfrm>
+            <a:off x="0" y="685800"/>
+            <a:ext cx="6858000" cy="3429000"/>
+          </a:xfrm>
+          <a:custGeom>
+            <a:avLst/>
+            <a:gdLst/>
+            <a:ahLst/>
+            <a:cxnLst/>
+            <a:rect l="l" t="t" r="r" b="b"/>
+            <a:pathLst>
+              <a:path w="120000" h="120000" extrusionOk="0">
+                <a:moveTo>
+                  <a:pt x="0" y="0"/>
+                </a:moveTo>
+                <a:lnTo>
+                  <a:pt x="120000" y="0"/>
+                </a:lnTo>
+                <a:lnTo>
+                  <a:pt x="120000" y="120000"/>
+                </a:lnTo>
+                <a:lnTo>
+                  <a:pt x="0" y="120000"/>
+                </a:lnTo>
+                <a:close/>
+              </a:path>
+            </a:pathLst>
+          </a:custGeom>
+        </p:spPr>
+      </p:sp>
+      <p:sp>
+        <p:nvSpPr>
+          <p:cNvPr id="219" name="Google Shape;219;g3850b307b58_0_258:notes"/>
+          <p:cNvSpPr txBox="1">
+            <a:spLocks noGrp="1"/>
+          </p:cNvSpPr>
+          <p:nvPr>
+            <p:ph type="body" idx="1"/>
+          </p:nvPr>
+        </p:nvSpPr>
+        <p:spPr>
+          <a:xfrm>
+            <a:off x="685800" y="4343400"/>
+            <a:ext cx="5486400" cy="4114800"/>
+          </a:xfrm>
+          <a:prstGeom prst="rect">
+            <a:avLst/>
+          </a:prstGeom>
+        </p:spPr>
+        <p:txBody>
+          <a:bodyPr spcFirstLastPara="1" wrap="square" lIns="91425" tIns="91425" rIns="91425" bIns="91425" anchor="t" anchorCtr="0">
+            <a:noAutofit/>
+          </a:bodyPr>
+          <a:lstStyle/>
+          <a:p>
+            <a:pPr marL="0" lvl="0" indent="0" algn="l" rtl="0">
+              <a:spcBef>
+                <a:spcPts val="0"/>
+              </a:spcBef>
+              <a:spcAft>
+                <a:spcPts val="0"/>
+              </a:spcAft>
+              <a:buNone/>
+            </a:pPr>
+            <a:endParaRPr/>
+          </a:p>
+        </p:txBody>
+      </p:sp>
+    </p:spTree>
+  </p:cSld>
+  <p:clrMapOvr>
+    <a:masterClrMapping/>
+  </p:clrMapOvr>
+</p:notes>
+</file>
+
 <file path=ppt/notesSlides/notesSlide2.xml><?xml version="1.0" encoding="utf-8"?>
 <p:notes xmlns:a="http://schemas.openxmlformats.org/drawingml/2006/main" xmlns:r="http://schemas.openxmlformats.org/officeDocument/2006/relationships" xmlns:p="http://schemas.openxmlformats.org/presentationml/2006/main" showMasterSp="0" showMasterPhAnim="0">
   <p:cSld>
@@ -1684,7 +1789,13 @@
   <p:cSld>
     <p:spTree>
       <p:nvGrpSpPr>
-        <p:cNvPr id="1" name="Shape 217"/>
+        <p:cNvPr id="1" name="Shape 62">
+          <a:extLst>
+            <a:ext uri="{FF2B5EF4-FFF2-40B4-BE49-F238E27FC236}">
+              <a16:creationId xmlns:a16="http://schemas.microsoft.com/office/drawing/2014/main" id="{C155A5FF-F0A7-8688-56DE-CBC590BAEFEE}"/>
+            </a:ext>
+          </a:extLst>
+        </p:cNvPr>
         <p:cNvGrpSpPr/>
         <p:nvPr/>
       </p:nvGrpSpPr>
@@ -1698,7 +1809,13 @@
       </p:grpSpPr>
       <p:sp>
         <p:nvSpPr>
-          <p:cNvPr id="218" name="Google Shape;218;g3850b307b58_0_258:notes"/>
+          <p:cNvPr id="63" name="Google Shape;63;g3850b307b58_0_0:notes">
+            <a:extLst>
+              <a:ext uri="{FF2B5EF4-FFF2-40B4-BE49-F238E27FC236}">
+                <a16:creationId xmlns:a16="http://schemas.microsoft.com/office/drawing/2014/main" id="{2667F0A5-074A-1F89-D8AA-2F72C553FB5F}"/>
+              </a:ext>
+            </a:extLst>
+          </p:cNvPr>
           <p:cNvSpPr>
             <a:spLocks noGrp="1" noRot="1" noChangeAspect="1"/>
           </p:cNvSpPr>
@@ -1739,7 +1856,13 @@
       </p:sp>
       <p:sp>
         <p:nvSpPr>
-          <p:cNvPr id="219" name="Google Shape;219;g3850b307b58_0_258:notes"/>
+          <p:cNvPr id="64" name="Google Shape;64;g3850b307b58_0_0:notes">
+            <a:extLst>
+              <a:ext uri="{FF2B5EF4-FFF2-40B4-BE49-F238E27FC236}">
+                <a16:creationId xmlns:a16="http://schemas.microsoft.com/office/drawing/2014/main" id="{E8B9BEE9-2445-1101-D419-27AE4B48F204}"/>
+              </a:ext>
+            </a:extLst>
+          </p:cNvPr>
           <p:cNvSpPr txBox="1">
             <a:spLocks noGrp="1"/>
           </p:cNvSpPr>
@@ -1776,6 +1899,11 @@
         </p:txBody>
       </p:sp>
     </p:spTree>
+    <p:extLst>
+      <p:ext uri="{BB962C8B-B14F-4D97-AF65-F5344CB8AC3E}">
+        <p14:creationId xmlns:p14="http://schemas.microsoft.com/office/powerpoint/2010/main" val="2697163263"/>
+      </p:ext>
+    </p:extLst>
   </p:cSld>
   <p:clrMapOvr>
     <a:masterClrMapping/>
@@ -6613,6 +6741,137 @@
 </p:sld>
 </file>
 
+<file path=ppt/slides/slide10.xml><?xml version="1.0" encoding="utf-8"?>
+<p:sld xmlns:a="http://schemas.openxmlformats.org/drawingml/2006/main" xmlns:r="http://schemas.openxmlformats.org/officeDocument/2006/relationships" xmlns:p="http://schemas.openxmlformats.org/presentationml/2006/main">
+  <p:cSld>
+    <p:spTree>
+      <p:nvGrpSpPr>
+        <p:cNvPr id="1" name="Shape 220"/>
+        <p:cNvGrpSpPr/>
+        <p:nvPr/>
+      </p:nvGrpSpPr>
+      <p:grpSpPr>
+        <a:xfrm>
+          <a:off x="0" y="0"/>
+          <a:ext cx="0" cy="0"/>
+          <a:chOff x="0" y="0"/>
+          <a:chExt cx="0" cy="0"/>
+        </a:xfrm>
+      </p:grpSpPr>
+      <p:pic>
+        <p:nvPicPr>
+          <p:cNvPr id="221" name="Google Shape;221;p20" title="Vmw_I2.png"/>
+          <p:cNvPicPr preferRelativeResize="0"/>
+          <p:nvPr/>
+        </p:nvPicPr>
+        <p:blipFill>
+          <a:blip r:embed="rId3">
+            <a:alphaModFix amt="51000"/>
+          </a:blip>
+          <a:stretch>
+            <a:fillRect/>
+          </a:stretch>
+        </p:blipFill>
+        <p:spPr>
+          <a:xfrm>
+            <a:off x="0" y="0"/>
+            <a:ext cx="21600000" cy="10800000"/>
+          </a:xfrm>
+          <a:prstGeom prst="rect">
+            <a:avLst/>
+          </a:prstGeom>
+          <a:noFill/>
+          <a:ln>
+            <a:noFill/>
+          </a:ln>
+        </p:spPr>
+      </p:pic>
+      <p:sp>
+        <p:nvSpPr>
+          <p:cNvPr id="222" name="Google Shape;222;p20"/>
+          <p:cNvSpPr/>
+          <p:nvPr/>
+        </p:nvSpPr>
+        <p:spPr>
+          <a:xfrm>
+            <a:off x="814250" y="3300663"/>
+            <a:ext cx="19957567" cy="4198675"/>
+          </a:xfrm>
+          <a:prstGeom prst="rect">
+            <a:avLst/>
+          </a:prstGeom>
+        </p:spPr>
+        <p:txBody>
+          <a:bodyPr>
+            <a:prstTxWarp prst="textPlain">
+              <a:avLst/>
+            </a:prstTxWarp>
+          </a:bodyPr>
+          <a:lstStyle/>
+          <a:p>
+            <a:pPr lvl="0" algn="ctr"/>
+            <a:r>
+              <a:rPr b="1" i="0" dirty="0">
+                <a:ln w="114300" cap="flat" cmpd="sng">
+                  <a:solidFill>
+                    <a:srgbClr val="434343"/>
+                  </a:solidFill>
+                  <a:prstDash val="solid"/>
+                  <a:round/>
+                  <a:headEnd type="none" w="sm" len="sm"/>
+                  <a:tailEnd type="none" w="sm" len="sm"/>
+                </a:ln>
+                <a:solidFill>
+                  <a:schemeClr val="lt1"/>
+                </a:solidFill>
+                <a:latin typeface="Consolas"/>
+              </a:rPr>
+              <a:t>Sprint </a:t>
+            </a:r>
+            <a:r>
+              <a:rPr lang="pt-PT" b="1" i="0" dirty="0">
+                <a:ln w="114300" cap="flat" cmpd="sng">
+                  <a:solidFill>
+                    <a:srgbClr val="434343"/>
+                  </a:solidFill>
+                  <a:prstDash val="solid"/>
+                  <a:round/>
+                  <a:headEnd type="none" w="sm" len="sm"/>
+                  <a:tailEnd type="none" w="sm" len="sm"/>
+                </a:ln>
+                <a:solidFill>
+                  <a:schemeClr val="lt1"/>
+                </a:solidFill>
+                <a:latin typeface="Consolas"/>
+              </a:rPr>
+              <a:t>3</a:t>
+            </a:r>
+            <a:endParaRPr b="1" i="0" dirty="0">
+              <a:ln w="114300" cap="flat" cmpd="sng">
+                <a:solidFill>
+                  <a:srgbClr val="434343"/>
+                </a:solidFill>
+                <a:prstDash val="solid"/>
+                <a:round/>
+                <a:headEnd type="none" w="sm" len="sm"/>
+                <a:tailEnd type="none" w="sm" len="sm"/>
+              </a:ln>
+              <a:solidFill>
+                <a:schemeClr val="lt1"/>
+              </a:solidFill>
+              <a:latin typeface="Consolas"/>
+            </a:endParaRPr>
+          </a:p>
+        </p:txBody>
+      </p:sp>
+    </p:spTree>
+  </p:cSld>
+  <p:clrMapOvr>
+    <a:masterClrMapping/>
+  </p:clrMapOvr>
+</p:sld>
+</file>
+
 <file path=ppt/slides/slide2.xml><?xml version="1.0" encoding="utf-8"?>
 <p:sld xmlns:a="http://schemas.openxmlformats.org/drawingml/2006/main" xmlns:r="http://schemas.openxmlformats.org/officeDocument/2006/relationships" xmlns:p="http://schemas.openxmlformats.org/presentationml/2006/main">
   <p:cSld>
@@ -14632,7 +14891,13 @@
   <p:cSld>
     <p:spTree>
       <p:nvGrpSpPr>
-        <p:cNvPr id="1" name="Shape 220"/>
+        <p:cNvPr id="1" name="Shape 65">
+          <a:extLst>
+            <a:ext uri="{FF2B5EF4-FFF2-40B4-BE49-F238E27FC236}">
+              <a16:creationId xmlns:a16="http://schemas.microsoft.com/office/drawing/2014/main" id="{5A2A595E-89C9-DBFE-54A6-F0BDBD2127B4}"/>
+            </a:ext>
+          </a:extLst>
+        </p:cNvPr>
         <p:cNvGrpSpPr/>
         <p:nvPr/>
       </p:nvGrpSpPr>
@@ -14644,113 +14909,1353 @@
           <a:chExt cx="0" cy="0"/>
         </a:xfrm>
       </p:grpSpPr>
-      <p:pic>
-        <p:nvPicPr>
-          <p:cNvPr id="221" name="Google Shape;221;p20" title="Vmw_I2.png"/>
-          <p:cNvPicPr preferRelativeResize="0"/>
+      <p:cxnSp>
+        <p:nvCxnSpPr>
+          <p:cNvPr id="66" name="Google Shape;66;p15">
+            <a:extLst>
+              <a:ext uri="{FF2B5EF4-FFF2-40B4-BE49-F238E27FC236}">
+                <a16:creationId xmlns:a16="http://schemas.microsoft.com/office/drawing/2014/main" id="{C8169670-FEA0-998F-603A-26E5E3C3CED2}"/>
+              </a:ext>
+            </a:extLst>
+          </p:cNvPr>
+          <p:cNvCxnSpPr/>
           <p:nvPr/>
-        </p:nvPicPr>
-        <p:blipFill>
-          <a:blip r:embed="rId3">
-            <a:alphaModFix amt="51000"/>
-          </a:blip>
-          <a:stretch>
-            <a:fillRect/>
-          </a:stretch>
-        </p:blipFill>
-        <p:spPr>
-          <a:xfrm>
-            <a:off x="0" y="0"/>
-            <a:ext cx="21600000" cy="10800000"/>
-          </a:xfrm>
-          <a:prstGeom prst="rect">
+        </p:nvCxnSpPr>
+        <p:spPr>
+          <a:xfrm>
+            <a:off x="5944724" y="-31500"/>
+            <a:ext cx="0" cy="10857000"/>
+          </a:xfrm>
+          <a:prstGeom prst="straightConnector1">
             <a:avLst/>
           </a:prstGeom>
           <a:noFill/>
-          <a:ln>
-            <a:noFill/>
+          <a:ln w="38100" cap="flat" cmpd="sng">
+            <a:solidFill>
+              <a:srgbClr val="5B0F00"/>
+            </a:solidFill>
+            <a:prstDash val="solid"/>
+            <a:round/>
+            <a:headEnd type="none" w="med" len="med"/>
+            <a:tailEnd type="none" w="med" len="med"/>
           </a:ln>
         </p:spPr>
-      </p:pic>
-      <p:sp>
-        <p:nvSpPr>
-          <p:cNvPr id="222" name="Google Shape;222;p20"/>
+      </p:cxnSp>
+      <p:sp>
+        <p:nvSpPr>
+          <p:cNvPr id="67" name="Google Shape;67;p15">
+            <a:extLst>
+              <a:ext uri="{FF2B5EF4-FFF2-40B4-BE49-F238E27FC236}">
+                <a16:creationId xmlns:a16="http://schemas.microsoft.com/office/drawing/2014/main" id="{2E7A4788-B51D-F9D7-5273-8D8E32E0EF89}"/>
+              </a:ext>
+            </a:extLst>
+          </p:cNvPr>
           <p:cNvSpPr/>
           <p:nvPr/>
         </p:nvSpPr>
         <p:spPr>
           <a:xfrm>
-            <a:off x="814250" y="3300663"/>
-            <a:ext cx="19957567" cy="4198675"/>
-          </a:xfrm>
-          <a:prstGeom prst="rect">
+            <a:off x="3197186" y="84312"/>
+            <a:ext cx="2410800" cy="480900"/>
+          </a:xfrm>
+          <a:prstGeom prst="roundRect">
+            <a:avLst>
+              <a:gd name="adj" fmla="val 16667"/>
+            </a:avLst>
+          </a:prstGeom>
+          <a:solidFill>
+            <a:srgbClr val="F9CB9C"/>
+          </a:solidFill>
+          <a:ln w="28575" cap="flat" cmpd="sng">
+            <a:solidFill>
+              <a:srgbClr val="B45F06"/>
+            </a:solidFill>
+            <a:prstDash val="solid"/>
+            <a:round/>
+            <a:headEnd type="none" w="sm" len="sm"/>
+            <a:tailEnd type="none" w="sm" len="sm"/>
+          </a:ln>
+        </p:spPr>
+        <p:txBody>
+          <a:bodyPr spcFirstLastPara="1" wrap="square" lIns="91425" tIns="91425" rIns="91425" bIns="91425" anchor="ctr" anchorCtr="0">
+            <a:noAutofit/>
+          </a:bodyPr>
+          <a:lstStyle/>
+          <a:p>
+            <a:pPr marL="0" lvl="0" indent="0" algn="ctr" rtl="0">
+              <a:spcBef>
+                <a:spcPts val="0"/>
+              </a:spcBef>
+              <a:spcAft>
+                <a:spcPts val="0"/>
+              </a:spcAft>
+              <a:buNone/>
+            </a:pPr>
+            <a:r>
+              <a:rPr lang="en-US" sz="1800" b="1" noProof="0" dirty="0">
+                <a:latin typeface="Consolas"/>
+                <a:ea typeface="Consolas"/>
+                <a:cs typeface="Consolas"/>
+                <a:sym typeface="Consolas"/>
+              </a:rPr>
+              <a:t>Student ID</a:t>
+            </a:r>
+          </a:p>
+        </p:txBody>
+      </p:sp>
+      <p:sp>
+        <p:nvSpPr>
+          <p:cNvPr id="68" name="Google Shape;68;p15">
+            <a:extLst>
+              <a:ext uri="{FF2B5EF4-FFF2-40B4-BE49-F238E27FC236}">
+                <a16:creationId xmlns:a16="http://schemas.microsoft.com/office/drawing/2014/main" id="{6212ABA5-F19C-A888-5574-52016D0310E4}"/>
+              </a:ext>
+            </a:extLst>
+          </p:cNvPr>
+          <p:cNvSpPr/>
+          <p:nvPr/>
+        </p:nvSpPr>
+        <p:spPr>
+          <a:xfrm>
+            <a:off x="6281636" y="84312"/>
+            <a:ext cx="2410800" cy="480900"/>
+          </a:xfrm>
+          <a:prstGeom prst="roundRect">
+            <a:avLst>
+              <a:gd name="adj" fmla="val 16667"/>
+            </a:avLst>
+          </a:prstGeom>
+          <a:solidFill>
+            <a:srgbClr val="F9CB9C"/>
+          </a:solidFill>
+          <a:ln w="28575" cap="flat" cmpd="sng">
+            <a:solidFill>
+              <a:srgbClr val="B45F06"/>
+            </a:solidFill>
+            <a:prstDash val="solid"/>
+            <a:round/>
+            <a:headEnd type="none" w="sm" len="sm"/>
+            <a:tailEnd type="none" w="sm" len="sm"/>
+          </a:ln>
+        </p:spPr>
+        <p:txBody>
+          <a:bodyPr spcFirstLastPara="1" wrap="square" lIns="91425" tIns="91425" rIns="91425" bIns="91425" anchor="ctr" anchorCtr="0">
+            <a:noAutofit/>
+          </a:bodyPr>
+          <a:lstStyle/>
+          <a:p>
+            <a:pPr marL="0" lvl="0" indent="0" algn="ctr" rtl="0">
+              <a:spcBef>
+                <a:spcPts val="0"/>
+              </a:spcBef>
+              <a:spcAft>
+                <a:spcPts val="0"/>
+              </a:spcAft>
+              <a:buNone/>
+            </a:pPr>
+            <a:r>
+              <a:rPr lang="en-US" sz="1800" b="1" noProof="0" dirty="0">
+                <a:latin typeface="Consolas"/>
+                <a:ea typeface="Consolas"/>
+                <a:cs typeface="Consolas"/>
+                <a:sym typeface="Consolas"/>
+              </a:rPr>
+              <a:t>Story</a:t>
+            </a:r>
+          </a:p>
+        </p:txBody>
+      </p:sp>
+      <p:sp>
+        <p:nvSpPr>
+          <p:cNvPr id="69" name="Google Shape;69;p15">
+            <a:extLst>
+              <a:ext uri="{FF2B5EF4-FFF2-40B4-BE49-F238E27FC236}">
+                <a16:creationId xmlns:a16="http://schemas.microsoft.com/office/drawing/2014/main" id="{87146C62-CBA4-107E-6E2B-FD96ABD0EE6E}"/>
+              </a:ext>
+            </a:extLst>
+          </p:cNvPr>
+          <p:cNvSpPr/>
+          <p:nvPr/>
+        </p:nvSpPr>
+        <p:spPr>
+          <a:xfrm>
+            <a:off x="9366071" y="84312"/>
+            <a:ext cx="2410800" cy="480900"/>
+          </a:xfrm>
+          <a:prstGeom prst="roundRect">
+            <a:avLst>
+              <a:gd name="adj" fmla="val 16667"/>
+            </a:avLst>
+          </a:prstGeom>
+          <a:solidFill>
+            <a:srgbClr val="F9CB9C"/>
+          </a:solidFill>
+          <a:ln w="28575" cap="flat" cmpd="sng">
+            <a:solidFill>
+              <a:srgbClr val="B45F06"/>
+            </a:solidFill>
+            <a:prstDash val="solid"/>
+            <a:round/>
+            <a:headEnd type="none" w="sm" len="sm"/>
+            <a:tailEnd type="none" w="sm" len="sm"/>
+          </a:ln>
+        </p:spPr>
+        <p:txBody>
+          <a:bodyPr spcFirstLastPara="1" wrap="square" lIns="91425" tIns="91425" rIns="91425" bIns="91425" anchor="ctr" anchorCtr="0">
+            <a:noAutofit/>
+          </a:bodyPr>
+          <a:lstStyle/>
+          <a:p>
+            <a:pPr marL="0" lvl="0" indent="0" algn="ctr" rtl="0">
+              <a:spcBef>
+                <a:spcPts val="0"/>
+              </a:spcBef>
+              <a:spcAft>
+                <a:spcPts val="0"/>
+              </a:spcAft>
+              <a:buNone/>
+            </a:pPr>
+            <a:r>
+              <a:rPr lang="en-US" sz="1800" b="1" noProof="0" dirty="0">
+                <a:latin typeface="Consolas"/>
+                <a:ea typeface="Consolas"/>
+                <a:cs typeface="Consolas"/>
+                <a:sym typeface="Consolas"/>
+              </a:rPr>
+              <a:t>To Do</a:t>
+            </a:r>
+          </a:p>
+        </p:txBody>
+      </p:sp>
+      <p:sp>
+        <p:nvSpPr>
+          <p:cNvPr id="70" name="Google Shape;70;p15">
+            <a:extLst>
+              <a:ext uri="{FF2B5EF4-FFF2-40B4-BE49-F238E27FC236}">
+                <a16:creationId xmlns:a16="http://schemas.microsoft.com/office/drawing/2014/main" id="{459E98A4-48F8-E73F-1959-BB7B2395E257}"/>
+              </a:ext>
+            </a:extLst>
+          </p:cNvPr>
+          <p:cNvSpPr/>
+          <p:nvPr/>
+        </p:nvSpPr>
+        <p:spPr>
+          <a:xfrm>
+            <a:off x="12395940" y="84312"/>
+            <a:ext cx="2410800" cy="480900"/>
+          </a:xfrm>
+          <a:prstGeom prst="roundRect">
+            <a:avLst>
+              <a:gd name="adj" fmla="val 16667"/>
+            </a:avLst>
+          </a:prstGeom>
+          <a:solidFill>
+            <a:srgbClr val="F9CB9C"/>
+          </a:solidFill>
+          <a:ln w="28575" cap="flat" cmpd="sng">
+            <a:solidFill>
+              <a:srgbClr val="B45F06"/>
+            </a:solidFill>
+            <a:prstDash val="solid"/>
+            <a:round/>
+            <a:headEnd type="none" w="sm" len="sm"/>
+            <a:tailEnd type="none" w="sm" len="sm"/>
+          </a:ln>
+        </p:spPr>
+        <p:txBody>
+          <a:bodyPr spcFirstLastPara="1" wrap="square" lIns="91425" tIns="91425" rIns="91425" bIns="91425" anchor="ctr" anchorCtr="0">
+            <a:noAutofit/>
+          </a:bodyPr>
+          <a:lstStyle/>
+          <a:p>
+            <a:pPr marL="0" lvl="0" indent="0" algn="ctr" rtl="0">
+              <a:spcBef>
+                <a:spcPts val="0"/>
+              </a:spcBef>
+              <a:spcAft>
+                <a:spcPts val="0"/>
+              </a:spcAft>
+              <a:buNone/>
+            </a:pPr>
+            <a:r>
+              <a:rPr lang="en-US" sz="1800" b="1" noProof="0" dirty="0">
+                <a:latin typeface="Consolas"/>
+                <a:ea typeface="Consolas"/>
+                <a:cs typeface="Consolas"/>
+                <a:sym typeface="Consolas"/>
+              </a:rPr>
+              <a:t>Doing</a:t>
+            </a:r>
+          </a:p>
+        </p:txBody>
+      </p:sp>
+      <p:sp>
+        <p:nvSpPr>
+          <p:cNvPr id="71" name="Google Shape;71;p15">
+            <a:extLst>
+              <a:ext uri="{FF2B5EF4-FFF2-40B4-BE49-F238E27FC236}">
+                <a16:creationId xmlns:a16="http://schemas.microsoft.com/office/drawing/2014/main" id="{2DCE664E-A4E1-B8FA-803A-4640222CE990}"/>
+              </a:ext>
+            </a:extLst>
+          </p:cNvPr>
+          <p:cNvSpPr/>
+          <p:nvPr/>
+        </p:nvSpPr>
+        <p:spPr>
+          <a:xfrm>
+            <a:off x="15532407" y="84312"/>
+            <a:ext cx="2410800" cy="480900"/>
+          </a:xfrm>
+          <a:prstGeom prst="roundRect">
+            <a:avLst>
+              <a:gd name="adj" fmla="val 16667"/>
+            </a:avLst>
+          </a:prstGeom>
+          <a:solidFill>
+            <a:srgbClr val="F9CB9C"/>
+          </a:solidFill>
+          <a:ln w="28575" cap="flat" cmpd="sng">
+            <a:solidFill>
+              <a:srgbClr val="B45F06"/>
+            </a:solidFill>
+            <a:prstDash val="solid"/>
+            <a:round/>
+            <a:headEnd type="none" w="sm" len="sm"/>
+            <a:tailEnd type="none" w="sm" len="sm"/>
+          </a:ln>
+        </p:spPr>
+        <p:txBody>
+          <a:bodyPr spcFirstLastPara="1" wrap="square" lIns="91425" tIns="91425" rIns="91425" bIns="91425" anchor="ctr" anchorCtr="0">
+            <a:noAutofit/>
+          </a:bodyPr>
+          <a:lstStyle/>
+          <a:p>
+            <a:pPr marL="0" lvl="0" indent="0" algn="ctr" rtl="0">
+              <a:spcBef>
+                <a:spcPts val="0"/>
+              </a:spcBef>
+              <a:spcAft>
+                <a:spcPts val="0"/>
+              </a:spcAft>
+              <a:buNone/>
+            </a:pPr>
+            <a:r>
+              <a:rPr lang="en-US" sz="1800" b="1" noProof="0" dirty="0">
+                <a:latin typeface="Consolas"/>
+                <a:ea typeface="Consolas"/>
+                <a:cs typeface="Consolas"/>
+                <a:sym typeface="Consolas"/>
+              </a:rPr>
+              <a:t>Review</a:t>
+            </a:r>
+          </a:p>
+        </p:txBody>
+      </p:sp>
+      <p:sp>
+        <p:nvSpPr>
+          <p:cNvPr id="72" name="Google Shape;72;p15">
+            <a:extLst>
+              <a:ext uri="{FF2B5EF4-FFF2-40B4-BE49-F238E27FC236}">
+                <a16:creationId xmlns:a16="http://schemas.microsoft.com/office/drawing/2014/main" id="{472DE61C-1E4C-B2D8-38E5-C316A0538140}"/>
+              </a:ext>
+            </a:extLst>
+          </p:cNvPr>
+          <p:cNvSpPr/>
+          <p:nvPr/>
+        </p:nvSpPr>
+        <p:spPr>
+          <a:xfrm>
+            <a:off x="18668888" y="84312"/>
+            <a:ext cx="2410800" cy="480900"/>
+          </a:xfrm>
+          <a:prstGeom prst="roundRect">
+            <a:avLst>
+              <a:gd name="adj" fmla="val 16667"/>
+            </a:avLst>
+          </a:prstGeom>
+          <a:solidFill>
+            <a:srgbClr val="F9CB9C"/>
+          </a:solidFill>
+          <a:ln w="28575" cap="flat" cmpd="sng">
+            <a:solidFill>
+              <a:srgbClr val="B45F06"/>
+            </a:solidFill>
+            <a:prstDash val="solid"/>
+            <a:round/>
+            <a:headEnd type="none" w="sm" len="sm"/>
+            <a:tailEnd type="none" w="sm" len="sm"/>
+          </a:ln>
+        </p:spPr>
+        <p:txBody>
+          <a:bodyPr spcFirstLastPara="1" wrap="square" lIns="91425" tIns="91425" rIns="91425" bIns="91425" anchor="ctr" anchorCtr="0">
+            <a:noAutofit/>
+          </a:bodyPr>
+          <a:lstStyle/>
+          <a:p>
+            <a:pPr marL="0" lvl="0" indent="0" algn="ctr" rtl="0">
+              <a:spcBef>
+                <a:spcPts val="0"/>
+              </a:spcBef>
+              <a:spcAft>
+                <a:spcPts val="0"/>
+              </a:spcAft>
+              <a:buNone/>
+            </a:pPr>
+            <a:r>
+              <a:rPr lang="en-US" sz="1800" b="1" noProof="0" dirty="0">
+                <a:latin typeface="Consolas"/>
+                <a:ea typeface="Consolas"/>
+                <a:cs typeface="Consolas"/>
+                <a:sym typeface="Consolas"/>
+              </a:rPr>
+              <a:t>Done</a:t>
+            </a:r>
+          </a:p>
+        </p:txBody>
+      </p:sp>
+      <p:sp>
+        <p:nvSpPr>
+          <p:cNvPr id="73" name="Google Shape;73;p15">
+            <a:extLst>
+              <a:ext uri="{FF2B5EF4-FFF2-40B4-BE49-F238E27FC236}">
+                <a16:creationId xmlns:a16="http://schemas.microsoft.com/office/drawing/2014/main" id="{364018F4-A097-A648-8B2B-3AE55AF3E00F}"/>
+              </a:ext>
+            </a:extLst>
+          </p:cNvPr>
+          <p:cNvSpPr/>
+          <p:nvPr/>
+        </p:nvSpPr>
+        <p:spPr>
+          <a:xfrm>
+            <a:off x="167288" y="84312"/>
+            <a:ext cx="2410800" cy="480900"/>
+          </a:xfrm>
+          <a:prstGeom prst="roundRect">
+            <a:avLst>
+              <a:gd name="adj" fmla="val 16667"/>
+            </a:avLst>
+          </a:prstGeom>
+          <a:solidFill>
+            <a:srgbClr val="F9CB9C"/>
+          </a:solidFill>
+          <a:ln w="28575" cap="flat" cmpd="sng">
+            <a:solidFill>
+              <a:srgbClr val="B45F06"/>
+            </a:solidFill>
+            <a:prstDash val="solid"/>
+            <a:round/>
+            <a:headEnd type="none" w="sm" len="sm"/>
+            <a:tailEnd type="none" w="sm" len="sm"/>
+          </a:ln>
+        </p:spPr>
+        <p:txBody>
+          <a:bodyPr spcFirstLastPara="1" wrap="square" lIns="91425" tIns="91425" rIns="91425" bIns="91425" anchor="ctr" anchorCtr="0">
+            <a:noAutofit/>
+          </a:bodyPr>
+          <a:lstStyle/>
+          <a:p>
+            <a:pPr marL="0" lvl="0" indent="0" algn="ctr" rtl="0">
+              <a:spcBef>
+                <a:spcPts val="0"/>
+              </a:spcBef>
+              <a:spcAft>
+                <a:spcPts val="0"/>
+              </a:spcAft>
+              <a:buNone/>
+            </a:pPr>
+            <a:r>
+              <a:rPr lang="en-US" sz="1800" b="1" noProof="0" dirty="0">
+                <a:latin typeface="Consolas"/>
+                <a:ea typeface="Consolas"/>
+                <a:cs typeface="Consolas"/>
+                <a:sym typeface="Consolas"/>
+              </a:rPr>
+              <a:t>Backlog</a:t>
+            </a:r>
+          </a:p>
+        </p:txBody>
+      </p:sp>
+      <p:sp>
+        <p:nvSpPr>
+          <p:cNvPr id="74" name="Google Shape;74;p15">
+            <a:extLst>
+              <a:ext uri="{FF2B5EF4-FFF2-40B4-BE49-F238E27FC236}">
+                <a16:creationId xmlns:a16="http://schemas.microsoft.com/office/drawing/2014/main" id="{12932627-CBEA-6C2D-97C6-F581FA27081E}"/>
+              </a:ext>
+            </a:extLst>
+          </p:cNvPr>
+          <p:cNvSpPr/>
+          <p:nvPr/>
+        </p:nvSpPr>
+        <p:spPr>
+          <a:xfrm>
+            <a:off x="3211113" y="5397000"/>
+            <a:ext cx="2410800" cy="480900"/>
+          </a:xfrm>
+          <a:prstGeom prst="roundRect">
+            <a:avLst>
+              <a:gd name="adj" fmla="val 16667"/>
+            </a:avLst>
+          </a:prstGeom>
+          <a:solidFill>
+            <a:srgbClr val="E6B8AF"/>
+          </a:solidFill>
+          <a:ln w="28575" cap="flat" cmpd="sng">
+            <a:solidFill>
+              <a:srgbClr val="5B0F00"/>
+            </a:solidFill>
+            <a:prstDash val="solid"/>
+            <a:round/>
+            <a:headEnd type="none" w="sm" len="sm"/>
+            <a:tailEnd type="none" w="sm" len="sm"/>
+          </a:ln>
+        </p:spPr>
+        <p:txBody>
+          <a:bodyPr spcFirstLastPara="1" wrap="square" lIns="91425" tIns="91425" rIns="91425" bIns="91425" anchor="ctr" anchorCtr="0">
+            <a:noAutofit/>
+          </a:bodyPr>
+          <a:lstStyle/>
+          <a:p>
+            <a:pPr marL="0" lvl="0" indent="0" algn="ctr" rtl="0">
+              <a:spcBef>
+                <a:spcPts val="0"/>
+              </a:spcBef>
+              <a:spcAft>
+                <a:spcPts val="0"/>
+              </a:spcAft>
+              <a:buNone/>
+            </a:pPr>
+            <a:r>
+              <a:rPr lang="en-US" sz="1800" b="1" noProof="0" dirty="0">
+                <a:latin typeface="Consolas"/>
+                <a:ea typeface="Consolas"/>
+                <a:cs typeface="Consolas"/>
+                <a:sym typeface="Consolas"/>
+              </a:rPr>
+              <a:t>Everyone</a:t>
+            </a:r>
+          </a:p>
+        </p:txBody>
+      </p:sp>
+      <p:sp>
+        <p:nvSpPr>
+          <p:cNvPr id="3" name="Google Shape;90;p15">
+            <a:extLst>
+              <a:ext uri="{FF2B5EF4-FFF2-40B4-BE49-F238E27FC236}">
+                <a16:creationId xmlns:a16="http://schemas.microsoft.com/office/drawing/2014/main" id="{FC6F0988-99FB-137D-67F7-05B5A9816499}"/>
+              </a:ext>
+            </a:extLst>
+          </p:cNvPr>
+          <p:cNvSpPr/>
+          <p:nvPr/>
+        </p:nvSpPr>
+        <p:spPr>
+          <a:xfrm>
+            <a:off x="18668888" y="849419"/>
+            <a:ext cx="2410800" cy="1648500"/>
+          </a:xfrm>
+          <a:prstGeom prst="roundRect">
+            <a:avLst>
+              <a:gd name="adj" fmla="val 16667"/>
+            </a:avLst>
+          </a:prstGeom>
+          <a:solidFill>
+            <a:srgbClr val="D0E0E3"/>
+          </a:solidFill>
+          <a:ln w="28575" cap="flat" cmpd="sng">
+            <a:solidFill>
+              <a:srgbClr val="134F5C"/>
+            </a:solidFill>
+            <a:prstDash val="solid"/>
+            <a:round/>
+            <a:headEnd type="none" w="sm" len="sm"/>
+            <a:tailEnd type="none" w="sm" len="sm"/>
+          </a:ln>
+        </p:spPr>
+        <p:txBody>
+          <a:bodyPr spcFirstLastPara="1" wrap="square" lIns="91425" tIns="91425" rIns="91425" bIns="91425" anchor="t" anchorCtr="0">
+            <a:noAutofit/>
+          </a:bodyPr>
+          <a:lstStyle/>
+          <a:p>
+            <a:pPr marL="0" lvl="0" indent="0" algn="l" rtl="0">
+              <a:spcBef>
+                <a:spcPts val="0"/>
+              </a:spcBef>
+              <a:spcAft>
+                <a:spcPts val="0"/>
+              </a:spcAft>
+              <a:buNone/>
+            </a:pPr>
+            <a:r>
+              <a:rPr lang="en-US" noProof="0" dirty="0">
+                <a:latin typeface="Consolas"/>
+                <a:ea typeface="Consolas"/>
+                <a:cs typeface="Consolas"/>
+                <a:sym typeface="Consolas"/>
+              </a:rPr>
+              <a:t>T2: Everyone: Playing the game so we can experience the user’s needs.</a:t>
+            </a:r>
+          </a:p>
+        </p:txBody>
+      </p:sp>
+      <p:sp>
+        <p:nvSpPr>
+          <p:cNvPr id="2" name="Google Shape;88;p15">
+            <a:extLst>
+              <a:ext uri="{FF2B5EF4-FFF2-40B4-BE49-F238E27FC236}">
+                <a16:creationId xmlns:a16="http://schemas.microsoft.com/office/drawing/2014/main" id="{89980944-1942-2BC2-8162-F5502E2D3D32}"/>
+              </a:ext>
+            </a:extLst>
+          </p:cNvPr>
+          <p:cNvSpPr/>
+          <p:nvPr/>
+        </p:nvSpPr>
+        <p:spPr>
+          <a:xfrm>
+            <a:off x="18668888" y="1957876"/>
+            <a:ext cx="2410800" cy="1648500"/>
+          </a:xfrm>
+          <a:prstGeom prst="roundRect">
+            <a:avLst>
+              <a:gd name="adj" fmla="val 16667"/>
+            </a:avLst>
+          </a:prstGeom>
+          <a:solidFill>
+            <a:srgbClr val="D9EAD3"/>
+          </a:solidFill>
+          <a:ln w="28575" cap="flat" cmpd="sng">
+            <a:solidFill>
+              <a:srgbClr val="274E13"/>
+            </a:solidFill>
+            <a:prstDash val="solid"/>
+            <a:round/>
+            <a:headEnd type="none" w="sm" len="sm"/>
+            <a:tailEnd type="none" w="sm" len="sm"/>
+          </a:ln>
+        </p:spPr>
+        <p:txBody>
+          <a:bodyPr spcFirstLastPara="1" wrap="square" lIns="91425" tIns="91425" rIns="91425" bIns="91425" anchor="t" anchorCtr="0">
+            <a:noAutofit/>
+          </a:bodyPr>
+          <a:lstStyle/>
+          <a:p>
+            <a:pPr marL="0" lvl="0" indent="0" algn="l" rtl="0">
+              <a:spcBef>
+                <a:spcPts val="0"/>
+              </a:spcBef>
+              <a:spcAft>
+                <a:spcPts val="0"/>
+              </a:spcAft>
+              <a:buNone/>
+            </a:pPr>
+            <a:r>
+              <a:rPr lang="en-US" noProof="0" dirty="0">
+                <a:latin typeface="Consolas"/>
+                <a:ea typeface="Consolas"/>
+                <a:cs typeface="Consolas"/>
+                <a:sym typeface="Consolas"/>
+              </a:rPr>
+              <a:t>T1: Make 3 User Stories</a:t>
+            </a:r>
+          </a:p>
+        </p:txBody>
+      </p:sp>
+      <p:sp>
+        <p:nvSpPr>
+          <p:cNvPr id="88" name="Google Shape;88;p15">
+            <a:extLst>
+              <a:ext uri="{FF2B5EF4-FFF2-40B4-BE49-F238E27FC236}">
+                <a16:creationId xmlns:a16="http://schemas.microsoft.com/office/drawing/2014/main" id="{5D6F3F5E-E672-0C1D-FBBB-FCE8D53D094D}"/>
+              </a:ext>
+            </a:extLst>
+          </p:cNvPr>
+          <p:cNvSpPr/>
+          <p:nvPr/>
+        </p:nvSpPr>
+        <p:spPr>
+          <a:xfrm>
+            <a:off x="18668888" y="2681513"/>
+            <a:ext cx="2410800" cy="1648500"/>
+          </a:xfrm>
+          <a:prstGeom prst="roundRect">
+            <a:avLst>
+              <a:gd name="adj" fmla="val 16667"/>
+            </a:avLst>
+          </a:prstGeom>
+          <a:solidFill>
+            <a:srgbClr val="D9EAD3"/>
+          </a:solidFill>
+          <a:ln w="28575" cap="flat" cmpd="sng">
+            <a:solidFill>
+              <a:srgbClr val="274E13"/>
+            </a:solidFill>
+            <a:prstDash val="solid"/>
+            <a:round/>
+            <a:headEnd type="none" w="sm" len="sm"/>
+            <a:tailEnd type="none" w="sm" len="sm"/>
+          </a:ln>
+        </p:spPr>
+        <p:txBody>
+          <a:bodyPr spcFirstLastPara="1" wrap="square" lIns="91425" tIns="91425" rIns="91425" bIns="91425" anchor="t" anchorCtr="0">
+            <a:noAutofit/>
+          </a:bodyPr>
+          <a:lstStyle/>
+          <a:p>
+            <a:pPr marL="0" lvl="0" indent="0" algn="l" rtl="0">
+              <a:spcBef>
+                <a:spcPts val="0"/>
+              </a:spcBef>
+              <a:spcAft>
+                <a:spcPts val="0"/>
+              </a:spcAft>
+              <a:buNone/>
+            </a:pPr>
+            <a:r>
+              <a:rPr lang="en-US" sz="2000" noProof="0" dirty="0">
+                <a:latin typeface="Consolas"/>
+                <a:ea typeface="Consolas"/>
+                <a:cs typeface="Consolas"/>
+                <a:sym typeface="Consolas"/>
+              </a:rPr>
+              <a:t>Find code smells</a:t>
+            </a:r>
+          </a:p>
+        </p:txBody>
+      </p:sp>
+      <p:cxnSp>
+        <p:nvCxnSpPr>
+          <p:cNvPr id="91" name="Google Shape;91;p15">
+            <a:extLst>
+              <a:ext uri="{FF2B5EF4-FFF2-40B4-BE49-F238E27FC236}">
+                <a16:creationId xmlns:a16="http://schemas.microsoft.com/office/drawing/2014/main" id="{2F352622-5E9D-BB9A-73AC-7E20E4193F56}"/>
+              </a:ext>
+            </a:extLst>
+          </p:cNvPr>
+          <p:cNvCxnSpPr/>
+          <p:nvPr/>
+        </p:nvCxnSpPr>
+        <p:spPr>
+          <a:xfrm>
+            <a:off x="2874374" y="-28500"/>
+            <a:ext cx="0" cy="10857000"/>
+          </a:xfrm>
+          <a:prstGeom prst="straightConnector1">
             <a:avLst/>
           </a:prstGeom>
-        </p:spPr>
-        <p:txBody>
-          <a:bodyPr>
-            <a:prstTxWarp prst="textPlain">
-              <a:avLst/>
-            </a:prstTxWarp>
+          <a:noFill/>
+          <a:ln w="38100" cap="flat" cmpd="sng">
+            <a:solidFill>
+              <a:srgbClr val="5B0F00"/>
+            </a:solidFill>
+            <a:prstDash val="solid"/>
+            <a:round/>
+            <a:headEnd type="none" w="med" len="med"/>
+            <a:tailEnd type="none" w="med" len="med"/>
+          </a:ln>
+        </p:spPr>
+      </p:cxnSp>
+      <p:sp>
+        <p:nvSpPr>
+          <p:cNvPr id="4" name="Google Shape;88;p15">
+            <a:extLst>
+              <a:ext uri="{FF2B5EF4-FFF2-40B4-BE49-F238E27FC236}">
+                <a16:creationId xmlns:a16="http://schemas.microsoft.com/office/drawing/2014/main" id="{4211F125-61A1-8CF4-7715-5F6FE1C31FE1}"/>
+              </a:ext>
+            </a:extLst>
+          </p:cNvPr>
+          <p:cNvSpPr/>
+          <p:nvPr/>
+        </p:nvSpPr>
+        <p:spPr>
+          <a:xfrm>
+            <a:off x="405410" y="694221"/>
+            <a:ext cx="1867580" cy="3160613"/>
+          </a:xfrm>
+          <a:prstGeom prst="roundRect">
+            <a:avLst>
+              <a:gd name="adj" fmla="val 16667"/>
+            </a:avLst>
+          </a:prstGeom>
+          <a:solidFill>
+            <a:srgbClr val="D9EAD3"/>
+          </a:solidFill>
+          <a:ln w="28575" cap="flat" cmpd="sng">
+            <a:solidFill>
+              <a:srgbClr val="274E13"/>
+            </a:solidFill>
+            <a:prstDash val="solid"/>
+            <a:round/>
+            <a:headEnd type="none" w="sm" len="sm"/>
+            <a:tailEnd type="none" w="sm" len="sm"/>
+          </a:ln>
+        </p:spPr>
+        <p:txBody>
+          <a:bodyPr spcFirstLastPara="1" wrap="square" lIns="91425" tIns="91425" rIns="91425" bIns="91425" anchor="t" anchorCtr="0">
+            <a:noAutofit/>
           </a:bodyPr>
           <a:lstStyle/>
           <a:p>
-            <a:pPr lvl="0" algn="ctr"/>
+            <a:pPr lvl="0"/>
             <a:r>
-              <a:rPr b="1" i="0" dirty="0">
-                <a:ln w="114300" cap="flat" cmpd="sng">
-                  <a:solidFill>
-                    <a:srgbClr val="434343"/>
-                  </a:solidFill>
-                  <a:prstDash val="solid"/>
-                  <a:round/>
-                  <a:headEnd type="none" w="sm" len="sm"/>
-                  <a:tailEnd type="none" w="sm" len="sm"/>
-                </a:ln>
-                <a:solidFill>
-                  <a:schemeClr val="lt1"/>
-                </a:solidFill>
-                <a:latin typeface="Consolas"/>
+              <a:rPr lang="en-US" noProof="0" dirty="0">
+                <a:latin typeface="Consolas" panose="020B0609020204030204" pitchFamily="49" charset="0"/>
+                <a:ea typeface="Consolas"/>
+                <a:cs typeface="Consolas"/>
+                <a:sym typeface="Consolas"/>
               </a:rPr>
-              <a:t>Sprint </a:t>
+              <a:t>US 3:</a:t>
             </a:r>
             <a:r>
-              <a:rPr lang="pt-PT" b="1" i="0" dirty="0">
-                <a:ln w="114300" cap="flat" cmpd="sng">
-                  <a:solidFill>
-                    <a:srgbClr val="434343"/>
-                  </a:solidFill>
-                  <a:prstDash val="solid"/>
-                  <a:round/>
-                  <a:headEnd type="none" w="sm" len="sm"/>
-                  <a:tailEnd type="none" w="sm" len="sm"/>
-                </a:ln>
-                <a:solidFill>
-                  <a:schemeClr val="lt1"/>
-                </a:solidFill>
+              <a:rPr lang="en-US" noProof="0" dirty="0">
+                <a:latin typeface="Consolas" panose="020B0609020204030204" pitchFamily="49" charset="0"/>
+              </a:rPr>
+              <a:t>As a player brand new to </a:t>
+            </a:r>
+            <a:r>
+              <a:rPr lang="en-US" noProof="0" dirty="0" err="1">
+                <a:latin typeface="Consolas" panose="020B0609020204030204" pitchFamily="49" charset="0"/>
+              </a:rPr>
+              <a:t>Mindustry</a:t>
+            </a:r>
+            <a:r>
+              <a:rPr lang="en-US" noProof="0" dirty="0">
+                <a:latin typeface="Consolas" panose="020B0609020204030204" pitchFamily="49" charset="0"/>
+              </a:rPr>
+              <a:t>, I want a more intuitive game tutorial so that I don't get lost and demotivated</a:t>
+            </a:r>
+            <a:r>
+              <a:rPr lang="en-US" noProof="0" dirty="0"/>
+              <a:t>.</a:t>
+            </a:r>
+            <a:endParaRPr lang="en-US" noProof="0" dirty="0">
+              <a:latin typeface="Consolas"/>
+              <a:ea typeface="Consolas"/>
+              <a:cs typeface="Consolas"/>
+              <a:sym typeface="Consolas"/>
+            </a:endParaRPr>
+          </a:p>
+        </p:txBody>
+      </p:sp>
+      <p:sp>
+        <p:nvSpPr>
+          <p:cNvPr id="90" name="Google Shape;90;p15">
+            <a:extLst>
+              <a:ext uri="{FF2B5EF4-FFF2-40B4-BE49-F238E27FC236}">
+                <a16:creationId xmlns:a16="http://schemas.microsoft.com/office/drawing/2014/main" id="{E2712A31-AE8E-A156-8193-B4CCF85ADE07}"/>
+              </a:ext>
+            </a:extLst>
+          </p:cNvPr>
+          <p:cNvSpPr/>
+          <p:nvPr/>
+        </p:nvSpPr>
+        <p:spPr>
+          <a:xfrm>
+            <a:off x="18668888" y="3523043"/>
+            <a:ext cx="2410800" cy="1648500"/>
+          </a:xfrm>
+          <a:prstGeom prst="roundRect">
+            <a:avLst>
+              <a:gd name="adj" fmla="val 16667"/>
+            </a:avLst>
+          </a:prstGeom>
+          <a:solidFill>
+            <a:srgbClr val="D0E0E3"/>
+          </a:solidFill>
+          <a:ln w="28575" cap="flat" cmpd="sng">
+            <a:solidFill>
+              <a:srgbClr val="134F5C"/>
+            </a:solidFill>
+            <a:prstDash val="solid"/>
+            <a:round/>
+            <a:headEnd type="none" w="sm" len="sm"/>
+            <a:tailEnd type="none" w="sm" len="sm"/>
+          </a:ln>
+        </p:spPr>
+        <p:txBody>
+          <a:bodyPr spcFirstLastPara="1" wrap="square" lIns="91425" tIns="91425" rIns="91425" bIns="91425" anchor="t" anchorCtr="0">
+            <a:noAutofit/>
+          </a:bodyPr>
+          <a:lstStyle/>
+          <a:p>
+            <a:pPr marL="0" lvl="0" indent="0" algn="l" rtl="0">
+              <a:spcBef>
+                <a:spcPts val="0"/>
+              </a:spcBef>
+              <a:spcAft>
+                <a:spcPts val="0"/>
+              </a:spcAft>
+              <a:buNone/>
+            </a:pPr>
+            <a:r>
+              <a:rPr lang="en-US" sz="2000" noProof="0" dirty="0">
                 <a:latin typeface="Consolas"/>
+                <a:ea typeface="Consolas"/>
+                <a:cs typeface="Consolas"/>
+                <a:sym typeface="Consolas"/>
               </a:rPr>
-              <a:t>3</a:t>
+              <a:t>Review other’s  code smells</a:t>
             </a:r>
-            <a:endParaRPr b="1" i="0" dirty="0">
-              <a:ln w="114300" cap="flat" cmpd="sng">
-                <a:solidFill>
-                  <a:srgbClr val="434343"/>
-                </a:solidFill>
-                <a:prstDash val="solid"/>
-                <a:round/>
-                <a:headEnd type="none" w="sm" len="sm"/>
-                <a:tailEnd type="none" w="sm" len="sm"/>
-              </a:ln>
-              <a:solidFill>
-                <a:schemeClr val="lt1"/>
-              </a:solidFill>
+          </a:p>
+        </p:txBody>
+      </p:sp>
+      <p:sp>
+        <p:nvSpPr>
+          <p:cNvPr id="5" name="Google Shape;88;p15">
+            <a:extLst>
+              <a:ext uri="{FF2B5EF4-FFF2-40B4-BE49-F238E27FC236}">
+                <a16:creationId xmlns:a16="http://schemas.microsoft.com/office/drawing/2014/main" id="{8098C960-FCB1-E6C9-566A-1DB5525C240C}"/>
+              </a:ext>
+            </a:extLst>
+          </p:cNvPr>
+          <p:cNvSpPr/>
+          <p:nvPr/>
+        </p:nvSpPr>
+        <p:spPr>
+          <a:xfrm>
+            <a:off x="438912" y="4038458"/>
+            <a:ext cx="1867552" cy="2826314"/>
+          </a:xfrm>
+          <a:prstGeom prst="roundRect">
+            <a:avLst>
+              <a:gd name="adj" fmla="val 16667"/>
+            </a:avLst>
+          </a:prstGeom>
+          <a:solidFill>
+            <a:srgbClr val="D9EAD3"/>
+          </a:solidFill>
+          <a:ln w="28575" cap="flat" cmpd="sng">
+            <a:solidFill>
+              <a:srgbClr val="274E13"/>
+            </a:solidFill>
+            <a:prstDash val="solid"/>
+            <a:round/>
+            <a:headEnd type="none" w="sm" len="sm"/>
+            <a:tailEnd type="none" w="sm" len="sm"/>
+          </a:ln>
+        </p:spPr>
+        <p:txBody>
+          <a:bodyPr spcFirstLastPara="1" wrap="square" lIns="91425" tIns="91425" rIns="91425" bIns="91425" anchor="t" anchorCtr="0">
+            <a:noAutofit/>
+          </a:bodyPr>
+          <a:lstStyle/>
+          <a:p>
+            <a:pPr marL="0" lvl="0" indent="0" algn="l" rtl="0">
+              <a:spcBef>
+                <a:spcPts val="0"/>
+              </a:spcBef>
+              <a:spcAft>
+                <a:spcPts val="0"/>
+              </a:spcAft>
+              <a:buNone/>
+            </a:pPr>
+            <a:r>
+              <a:rPr lang="en-US" noProof="0" dirty="0">
+                <a:latin typeface="Consolas"/>
+                <a:ea typeface="Consolas"/>
+                <a:cs typeface="Consolas"/>
+                <a:sym typeface="Consolas"/>
+              </a:rPr>
+              <a:t>US 2: As an experienced player I think we should have a greater diversity of towers that can help us automate the way we defend order</a:t>
+            </a:r>
+          </a:p>
+        </p:txBody>
+      </p:sp>
+      <p:sp>
+        <p:nvSpPr>
+          <p:cNvPr id="6" name="Google Shape;88;p15">
+            <a:extLst>
+              <a:ext uri="{FF2B5EF4-FFF2-40B4-BE49-F238E27FC236}">
+                <a16:creationId xmlns:a16="http://schemas.microsoft.com/office/drawing/2014/main" id="{81153B3B-2390-0930-C067-7B7BC2246080}"/>
+              </a:ext>
+            </a:extLst>
+          </p:cNvPr>
+          <p:cNvSpPr/>
+          <p:nvPr/>
+        </p:nvSpPr>
+        <p:spPr>
+          <a:xfrm>
+            <a:off x="405410" y="6982925"/>
+            <a:ext cx="1867580" cy="3160613"/>
+          </a:xfrm>
+          <a:prstGeom prst="roundRect">
+            <a:avLst>
+              <a:gd name="adj" fmla="val 16667"/>
+            </a:avLst>
+          </a:prstGeom>
+          <a:solidFill>
+            <a:srgbClr val="D9EAD3"/>
+          </a:solidFill>
+          <a:ln w="28575" cap="flat" cmpd="sng">
+            <a:solidFill>
+              <a:srgbClr val="274E13"/>
+            </a:solidFill>
+            <a:prstDash val="solid"/>
+            <a:round/>
+            <a:headEnd type="none" w="sm" len="sm"/>
+            <a:tailEnd type="none" w="sm" len="sm"/>
+          </a:ln>
+        </p:spPr>
+        <p:txBody>
+          <a:bodyPr spcFirstLastPara="1" wrap="square" lIns="91425" tIns="91425" rIns="91425" bIns="91425" anchor="t" anchorCtr="0">
+            <a:noAutofit/>
+          </a:bodyPr>
+          <a:lstStyle/>
+          <a:p>
+            <a:pPr marL="0" lvl="0" indent="0" algn="l" rtl="0">
+              <a:spcBef>
+                <a:spcPts val="0"/>
+              </a:spcBef>
+              <a:spcAft>
+                <a:spcPts val="0"/>
+              </a:spcAft>
+              <a:buNone/>
+            </a:pPr>
+            <a:r>
+              <a:rPr lang="en-US" noProof="0" dirty="0">
+                <a:latin typeface="Consolas"/>
+                <a:ea typeface="Consolas"/>
+                <a:cs typeface="Consolas"/>
+                <a:sym typeface="Consolas"/>
+              </a:rPr>
+              <a:t>US 1: As Player, I want to have access to a sandbox (free play) so that I can freely experiment with different constructions and strategies without enemies or attack waves.</a:t>
+            </a:r>
+          </a:p>
+        </p:txBody>
+      </p:sp>
+      <p:sp>
+        <p:nvSpPr>
+          <p:cNvPr id="7" name="Google Shape;88;p15">
+            <a:extLst>
+              <a:ext uri="{FF2B5EF4-FFF2-40B4-BE49-F238E27FC236}">
+                <a16:creationId xmlns:a16="http://schemas.microsoft.com/office/drawing/2014/main" id="{4F7D583C-A2C8-DD42-D239-3D883247C0EA}"/>
+              </a:ext>
+            </a:extLst>
+          </p:cNvPr>
+          <p:cNvSpPr/>
+          <p:nvPr/>
+        </p:nvSpPr>
+        <p:spPr>
+          <a:xfrm>
+            <a:off x="9365775" y="694221"/>
+            <a:ext cx="2410800" cy="1648500"/>
+          </a:xfrm>
+          <a:prstGeom prst="roundRect">
+            <a:avLst>
+              <a:gd name="adj" fmla="val 16667"/>
+            </a:avLst>
+          </a:prstGeom>
+          <a:solidFill>
+            <a:srgbClr val="D9EAD3"/>
+          </a:solidFill>
+          <a:ln w="28575" cap="flat" cmpd="sng">
+            <a:solidFill>
+              <a:srgbClr val="274E13"/>
+            </a:solidFill>
+            <a:prstDash val="solid"/>
+            <a:round/>
+            <a:headEnd type="none" w="sm" len="sm"/>
+            <a:tailEnd type="none" w="sm" len="sm"/>
+          </a:ln>
+        </p:spPr>
+        <p:txBody>
+          <a:bodyPr spcFirstLastPara="1" wrap="square" lIns="91425" tIns="91425" rIns="91425" bIns="91425" anchor="t" anchorCtr="0">
+            <a:noAutofit/>
+          </a:bodyPr>
+          <a:lstStyle/>
+          <a:p>
+            <a:pPr marL="0" lvl="0" indent="0" algn="l" rtl="0">
+              <a:spcBef>
+                <a:spcPts val="0"/>
+              </a:spcBef>
+              <a:spcAft>
+                <a:spcPts val="0"/>
+              </a:spcAft>
+              <a:buNone/>
+            </a:pPr>
+            <a:r>
+              <a:rPr lang="en-US" sz="2000" noProof="0" dirty="0">
+                <a:latin typeface="Consolas"/>
+                <a:ea typeface="Consolas"/>
+                <a:cs typeface="Consolas"/>
+                <a:sym typeface="Consolas"/>
+              </a:rPr>
+              <a:t>Create Use Case Diagrams</a:t>
+            </a:r>
+          </a:p>
+        </p:txBody>
+      </p:sp>
+      <p:sp>
+        <p:nvSpPr>
+          <p:cNvPr id="8" name="Google Shape;88;p15">
+            <a:extLst>
+              <a:ext uri="{FF2B5EF4-FFF2-40B4-BE49-F238E27FC236}">
+                <a16:creationId xmlns:a16="http://schemas.microsoft.com/office/drawing/2014/main" id="{B465E629-5EFB-25C0-FE86-860DCEA99BFD}"/>
+              </a:ext>
+            </a:extLst>
+          </p:cNvPr>
+          <p:cNvSpPr/>
+          <p:nvPr/>
+        </p:nvSpPr>
+        <p:spPr>
+          <a:xfrm>
+            <a:off x="9365775" y="1618255"/>
+            <a:ext cx="2410800" cy="1648500"/>
+          </a:xfrm>
+          <a:prstGeom prst="roundRect">
+            <a:avLst>
+              <a:gd name="adj" fmla="val 16667"/>
+            </a:avLst>
+          </a:prstGeom>
+          <a:solidFill>
+            <a:srgbClr val="D9EAD3"/>
+          </a:solidFill>
+          <a:ln w="28575" cap="flat" cmpd="sng">
+            <a:solidFill>
+              <a:srgbClr val="274E13"/>
+            </a:solidFill>
+            <a:prstDash val="solid"/>
+            <a:round/>
+            <a:headEnd type="none" w="sm" len="sm"/>
+            <a:tailEnd type="none" w="sm" len="sm"/>
+          </a:ln>
+        </p:spPr>
+        <p:txBody>
+          <a:bodyPr spcFirstLastPara="1" wrap="square" lIns="91425" tIns="91425" rIns="91425" bIns="91425" anchor="t" anchorCtr="0">
+            <a:noAutofit/>
+          </a:bodyPr>
+          <a:lstStyle/>
+          <a:p>
+            <a:pPr marL="0" lvl="0" indent="0" algn="l" rtl="0">
+              <a:spcBef>
+                <a:spcPts val="0"/>
+              </a:spcBef>
+              <a:spcAft>
+                <a:spcPts val="0"/>
+              </a:spcAft>
+              <a:buNone/>
+            </a:pPr>
+            <a:r>
+              <a:rPr lang="en-US" sz="2000" noProof="0" dirty="0">
+                <a:latin typeface="Consolas"/>
+                <a:ea typeface="Consolas"/>
+                <a:cs typeface="Consolas"/>
+                <a:sym typeface="Consolas"/>
+              </a:rPr>
+              <a:t>Review Use Case Diagrams</a:t>
+            </a:r>
+          </a:p>
+        </p:txBody>
+      </p:sp>
+      <p:sp>
+        <p:nvSpPr>
+          <p:cNvPr id="9" name="Google Shape;88;p15">
+            <a:extLst>
+              <a:ext uri="{FF2B5EF4-FFF2-40B4-BE49-F238E27FC236}">
+                <a16:creationId xmlns:a16="http://schemas.microsoft.com/office/drawing/2014/main" id="{5B61E9F2-9E12-E52B-3343-BE899E701A1F}"/>
+              </a:ext>
+            </a:extLst>
+          </p:cNvPr>
+          <p:cNvSpPr/>
+          <p:nvPr/>
+        </p:nvSpPr>
+        <p:spPr>
+          <a:xfrm>
+            <a:off x="9365775" y="2542289"/>
+            <a:ext cx="2410800" cy="1648500"/>
+          </a:xfrm>
+          <a:prstGeom prst="roundRect">
+            <a:avLst>
+              <a:gd name="adj" fmla="val 16667"/>
+            </a:avLst>
+          </a:prstGeom>
+          <a:solidFill>
+            <a:srgbClr val="D9EAD3"/>
+          </a:solidFill>
+          <a:ln w="28575" cap="flat" cmpd="sng">
+            <a:solidFill>
+              <a:srgbClr val="274E13"/>
+            </a:solidFill>
+            <a:prstDash val="solid"/>
+            <a:round/>
+            <a:headEnd type="none" w="sm" len="sm"/>
+            <a:tailEnd type="none" w="sm" len="sm"/>
+          </a:ln>
+        </p:spPr>
+        <p:txBody>
+          <a:bodyPr spcFirstLastPara="1" wrap="square" lIns="91425" tIns="91425" rIns="91425" bIns="91425" anchor="t" anchorCtr="0">
+            <a:noAutofit/>
+          </a:bodyPr>
+          <a:lstStyle/>
+          <a:p>
+            <a:pPr marL="0" lvl="0" indent="0" algn="l" rtl="0">
+              <a:spcBef>
+                <a:spcPts val="0"/>
+              </a:spcBef>
+              <a:spcAft>
+                <a:spcPts val="0"/>
+              </a:spcAft>
+              <a:buNone/>
+            </a:pPr>
+            <a:r>
+              <a:rPr lang="en-US" sz="2000" noProof="0" dirty="0">
+                <a:latin typeface="Consolas"/>
+                <a:ea typeface="Consolas"/>
+                <a:cs typeface="Consolas"/>
+                <a:sym typeface="Consolas"/>
+              </a:rPr>
+              <a:t>Identify Design Patterns</a:t>
+            </a:r>
+          </a:p>
+        </p:txBody>
+      </p:sp>
+      <p:sp>
+        <p:nvSpPr>
+          <p:cNvPr id="11" name="Google Shape;90;p15">
+            <a:extLst>
+              <a:ext uri="{FF2B5EF4-FFF2-40B4-BE49-F238E27FC236}">
+                <a16:creationId xmlns:a16="http://schemas.microsoft.com/office/drawing/2014/main" id="{A795FE8B-862C-9793-F732-7485D7AA04D2}"/>
+              </a:ext>
+            </a:extLst>
+          </p:cNvPr>
+          <p:cNvSpPr/>
+          <p:nvPr/>
+        </p:nvSpPr>
+        <p:spPr>
+          <a:xfrm>
+            <a:off x="9365775" y="3701554"/>
+            <a:ext cx="2410800" cy="1648500"/>
+          </a:xfrm>
+          <a:prstGeom prst="roundRect">
+            <a:avLst>
+              <a:gd name="adj" fmla="val 16667"/>
+            </a:avLst>
+          </a:prstGeom>
+          <a:solidFill>
+            <a:srgbClr val="D0E0E3"/>
+          </a:solidFill>
+          <a:ln w="28575" cap="flat" cmpd="sng">
+            <a:solidFill>
+              <a:srgbClr val="134F5C"/>
+            </a:solidFill>
+            <a:prstDash val="solid"/>
+            <a:round/>
+            <a:headEnd type="none" w="sm" len="sm"/>
+            <a:tailEnd type="none" w="sm" len="sm"/>
+          </a:ln>
+        </p:spPr>
+        <p:txBody>
+          <a:bodyPr spcFirstLastPara="1" wrap="square" lIns="91425" tIns="91425" rIns="91425" bIns="91425" anchor="t" anchorCtr="0">
+            <a:noAutofit/>
+          </a:bodyPr>
+          <a:lstStyle/>
+          <a:p>
+            <a:pPr marL="0" lvl="0" indent="0" algn="l" rtl="0">
+              <a:spcBef>
+                <a:spcPts val="0"/>
+              </a:spcBef>
+              <a:spcAft>
+                <a:spcPts val="0"/>
+              </a:spcAft>
+              <a:buNone/>
+            </a:pPr>
+            <a:r>
+              <a:rPr lang="en-US" sz="2000" noProof="0" dirty="0">
+                <a:latin typeface="Consolas"/>
+                <a:ea typeface="Consolas"/>
+                <a:cs typeface="Consolas"/>
+                <a:sym typeface="Consolas"/>
+              </a:rPr>
+              <a:t>Review Design Patterns</a:t>
+            </a:r>
+          </a:p>
+          <a:p>
+            <a:pPr marL="0" lvl="0" indent="0" algn="l" rtl="0">
+              <a:spcBef>
+                <a:spcPts val="0"/>
+              </a:spcBef>
+              <a:spcAft>
+                <a:spcPts val="0"/>
+              </a:spcAft>
+              <a:buNone/>
+            </a:pPr>
+            <a:endParaRPr lang="en-US" sz="2000" noProof="0" dirty="0">
               <a:latin typeface="Consolas"/>
+              <a:ea typeface="Consolas"/>
+              <a:cs typeface="Consolas"/>
+              <a:sym typeface="Consolas"/>
             </a:endParaRPr>
           </a:p>
         </p:txBody>
       </p:sp>
+      <p:sp>
+        <p:nvSpPr>
+          <p:cNvPr id="12" name="Google Shape;90;p15">
+            <a:extLst>
+              <a:ext uri="{FF2B5EF4-FFF2-40B4-BE49-F238E27FC236}">
+                <a16:creationId xmlns:a16="http://schemas.microsoft.com/office/drawing/2014/main" id="{909A9D16-5F73-8C63-470F-DCCD77FC0C03}"/>
+              </a:ext>
+            </a:extLst>
+          </p:cNvPr>
+          <p:cNvSpPr/>
+          <p:nvPr/>
+        </p:nvSpPr>
+        <p:spPr>
+          <a:xfrm>
+            <a:off x="9365775" y="4625588"/>
+            <a:ext cx="2410800" cy="2184131"/>
+          </a:xfrm>
+          <a:prstGeom prst="roundRect">
+            <a:avLst>
+              <a:gd name="adj" fmla="val 16667"/>
+            </a:avLst>
+          </a:prstGeom>
+          <a:solidFill>
+            <a:srgbClr val="D0E0E3"/>
+          </a:solidFill>
+          <a:ln w="28575" cap="flat" cmpd="sng">
+            <a:solidFill>
+              <a:srgbClr val="134F5C"/>
+            </a:solidFill>
+            <a:prstDash val="solid"/>
+            <a:round/>
+            <a:headEnd type="none" w="sm" len="sm"/>
+            <a:tailEnd type="none" w="sm" len="sm"/>
+          </a:ln>
+        </p:spPr>
+        <p:txBody>
+          <a:bodyPr spcFirstLastPara="1" wrap="square" lIns="91425" tIns="91425" rIns="91425" bIns="91425" anchor="t" anchorCtr="0">
+            <a:noAutofit/>
+          </a:bodyPr>
+          <a:lstStyle/>
+          <a:p>
+            <a:pPr marL="0" lvl="0" indent="0" algn="l" rtl="0">
+              <a:spcBef>
+                <a:spcPts val="0"/>
+              </a:spcBef>
+              <a:spcAft>
+                <a:spcPts val="0"/>
+              </a:spcAft>
+              <a:buNone/>
+            </a:pPr>
+            <a:r>
+              <a:rPr lang="en-US" sz="2000" noProof="0" dirty="0">
+                <a:latin typeface="Consolas"/>
+                <a:ea typeface="Consolas"/>
+                <a:cs typeface="Consolas"/>
+                <a:sym typeface="Consolas"/>
+              </a:rPr>
+              <a:t>Produce a report with the metrics – based overview of the code base</a:t>
+            </a:r>
+          </a:p>
+        </p:txBody>
+      </p:sp>
     </p:spTree>
+    <p:extLst>
+      <p:ext uri="{BB962C8B-B14F-4D97-AF65-F5344CB8AC3E}">
+        <p14:creationId xmlns:p14="http://schemas.microsoft.com/office/powerpoint/2010/main" val="2952492342"/>
+      </p:ext>
+    </p:extLst>
   </p:cSld>
   <p:clrMapOvr>
     <a:masterClrMapping/>

</xml_diff>